<commit_message>
updates to streamlit and notebook
</commit_message>
<xml_diff>
--- a/presentation.pptx
+++ b/presentation.pptx
@@ -2100,7 +2100,7 @@
             <a:fld id="{B61BEF0D-F0BB-DE4B-95CE-6DB70DBA9567}" type="datetimeFigureOut">
               <a:rPr lang="en-US" smtClean="0"/>
               <a:pPr/>
-              <a:t>10/3/2022</a:t>
+              <a:t>10/5/2022</a:t>
             </a:fld>
             <a:endParaRPr lang="en-US" dirty="0"/>
           </a:p>
@@ -3191,7 +3191,7 @@
             <a:fld id="{B61BEF0D-F0BB-DE4B-95CE-6DB70DBA9567}" type="datetimeFigureOut">
               <a:rPr lang="en-US" smtClean="0"/>
               <a:pPr/>
-              <a:t>10/3/2022</a:t>
+              <a:t>10/5/2022</a:t>
             </a:fld>
             <a:endParaRPr lang="en-US" dirty="0"/>
           </a:p>
@@ -4174,7 +4174,7 @@
             <a:fld id="{B61BEF0D-F0BB-DE4B-95CE-6DB70DBA9567}" type="datetimeFigureOut">
               <a:rPr lang="en-US" smtClean="0"/>
               <a:pPr/>
-              <a:t>10/3/2022</a:t>
+              <a:t>10/5/2022</a:t>
             </a:fld>
             <a:endParaRPr lang="en-US" dirty="0"/>
           </a:p>
@@ -5311,7 +5311,7 @@
             <a:fld id="{B61BEF0D-F0BB-DE4B-95CE-6DB70DBA9567}" type="datetimeFigureOut">
               <a:rPr lang="en-US" smtClean="0"/>
               <a:pPr/>
-              <a:t>10/3/2022</a:t>
+              <a:t>10/5/2022</a:t>
             </a:fld>
             <a:endParaRPr lang="en-US" dirty="0"/>
           </a:p>
@@ -6347,7 +6347,7 @@
             <a:fld id="{B61BEF0D-F0BB-DE4B-95CE-6DB70DBA9567}" type="datetimeFigureOut">
               <a:rPr lang="en-US" smtClean="0"/>
               <a:pPr/>
-              <a:t>10/3/2022</a:t>
+              <a:t>10/5/2022</a:t>
             </a:fld>
             <a:endParaRPr lang="en-US" dirty="0"/>
           </a:p>
@@ -7010,7 +7010,7 @@
             <a:fld id="{B61BEF0D-F0BB-DE4B-95CE-6DB70DBA9567}" type="datetimeFigureOut">
               <a:rPr lang="en-US" smtClean="0"/>
               <a:pPr/>
-              <a:t>10/3/2022</a:t>
+              <a:t>10/5/2022</a:t>
             </a:fld>
             <a:endParaRPr lang="en-US" dirty="0"/>
           </a:p>
@@ -7874,7 +7874,7 @@
             <a:fld id="{B61BEF0D-F0BB-DE4B-95CE-6DB70DBA9567}" type="datetimeFigureOut">
               <a:rPr lang="en-US" smtClean="0"/>
               <a:pPr/>
-              <a:t>10/3/2022</a:t>
+              <a:t>10/5/2022</a:t>
             </a:fld>
             <a:endParaRPr lang="en-US" dirty="0"/>
           </a:p>
@@ -8067,7 +8067,7 @@
             <a:fld id="{B61BEF0D-F0BB-DE4B-95CE-6DB70DBA9567}" type="datetimeFigureOut">
               <a:rPr lang="en-US" smtClean="0"/>
               <a:pPr/>
-              <a:t>10/3/2022</a:t>
+              <a:t>10/5/2022</a:t>
             </a:fld>
             <a:endParaRPr lang="en-US" dirty="0"/>
           </a:p>
@@ -9042,7 +9042,7 @@
             <a:fld id="{B61BEF0D-F0BB-DE4B-95CE-6DB70DBA9567}" type="datetimeFigureOut">
               <a:rPr lang="en-US" smtClean="0"/>
               <a:pPr/>
-              <a:t>10/3/2022</a:t>
+              <a:t>10/5/2022</a:t>
             </a:fld>
             <a:endParaRPr lang="en-US" dirty="0"/>
           </a:p>
@@ -11751,7 +11751,7 @@
             <a:fld id="{B61BEF0D-F0BB-DE4B-95CE-6DB70DBA9567}" type="datetimeFigureOut">
               <a:rPr lang="en-US" smtClean="0"/>
               <a:pPr/>
-              <a:t>10/3/2022</a:t>
+              <a:t>10/5/2022</a:t>
             </a:fld>
             <a:endParaRPr lang="en-US" dirty="0"/>
           </a:p>
@@ -14673,7 +14673,7 @@
             <a:fld id="{B61BEF0D-F0BB-DE4B-95CE-6DB70DBA9567}" type="datetimeFigureOut">
               <a:rPr lang="en-US" smtClean="0"/>
               <a:pPr/>
-              <a:t>10/3/2022</a:t>
+              <a:t>10/5/2022</a:t>
             </a:fld>
             <a:endParaRPr lang="en-US" dirty="0"/>
           </a:p>
@@ -14948,7 +14948,7 @@
             <a:fld id="{B61BEF0D-F0BB-DE4B-95CE-6DB70DBA9567}" type="datetimeFigureOut">
               <a:rPr lang="en-US" smtClean="0"/>
               <a:pPr/>
-              <a:t>10/3/2022</a:t>
+              <a:t>10/5/2022</a:t>
             </a:fld>
             <a:endParaRPr lang="en-US" dirty="0"/>
           </a:p>
@@ -15361,7 +15361,7 @@
             <a:fld id="{B61BEF0D-F0BB-DE4B-95CE-6DB70DBA9567}" type="datetimeFigureOut">
               <a:rPr lang="en-US" smtClean="0"/>
               <a:pPr/>
-              <a:t>10/3/2022</a:t>
+              <a:t>10/5/2022</a:t>
             </a:fld>
             <a:endParaRPr lang="en-US" dirty="0"/>
           </a:p>
@@ -15491,7 +15491,7 @@
             <a:fld id="{B61BEF0D-F0BB-DE4B-95CE-6DB70DBA9567}" type="datetimeFigureOut">
               <a:rPr lang="en-US" smtClean="0"/>
               <a:pPr/>
-              <a:t>10/3/2022</a:t>
+              <a:t>10/5/2022</a:t>
             </a:fld>
             <a:endParaRPr lang="en-US" dirty="0"/>
           </a:p>
@@ -15589,7 +15589,7 @@
             <a:fld id="{B61BEF0D-F0BB-DE4B-95CE-6DB70DBA9567}" type="datetimeFigureOut">
               <a:rPr lang="en-US" smtClean="0"/>
               <a:pPr/>
-              <a:t>10/3/2022</a:t>
+              <a:t>10/5/2022</a:t>
             </a:fld>
             <a:endParaRPr lang="en-US" dirty="0"/>
           </a:p>
@@ -16672,7 +16672,7 @@
             <a:fld id="{B61BEF0D-F0BB-DE4B-95CE-6DB70DBA9567}" type="datetimeFigureOut">
               <a:rPr lang="en-US" smtClean="0"/>
               <a:pPr/>
-              <a:t>10/3/2022</a:t>
+              <a:t>10/5/2022</a:t>
             </a:fld>
             <a:endParaRPr lang="en-US" dirty="0"/>
           </a:p>
@@ -17783,7 +17783,7 @@
             <a:fld id="{B61BEF0D-F0BB-DE4B-95CE-6DB70DBA9567}" type="datetimeFigureOut">
               <a:rPr lang="en-US" smtClean="0"/>
               <a:pPr/>
-              <a:t>10/3/2022</a:t>
+              <a:t>10/5/2022</a:t>
             </a:fld>
             <a:endParaRPr lang="en-US" dirty="0"/>
           </a:p>
@@ -18783,7 +18783,7 @@
             <a:fld id="{B61BEF0D-F0BB-DE4B-95CE-6DB70DBA9567}" type="datetimeFigureOut">
               <a:rPr lang="en-US" smtClean="0"/>
               <a:pPr/>
-              <a:t>10/3/2022</a:t>
+              <a:t>10/5/2022</a:t>
             </a:fld>
             <a:endParaRPr lang="en-US" dirty="0"/>
           </a:p>
@@ -19385,7 +19385,14 @@
             </a:pPr>
             <a:r>
               <a:rPr lang="en" sz="3200" b="1" dirty="0"/>
-              <a:t>Predicting Disbursement Fraud</a:t>
+              <a:t>Predicting Retail Fraud:</a:t>
+            </a:r>
+            <a:br>
+              <a:rPr lang="en" sz="3200" b="1" dirty="0"/>
+            </a:br>
+            <a:r>
+              <a:rPr lang="en" sz="3200" b="1" dirty="0"/>
+              <a:t>Customer Payments</a:t>
             </a:r>
             <a:br>
               <a:rPr lang="en" dirty="0"/>
@@ -19566,7 +19573,7 @@
         <p:spPr>
           <a:xfrm>
             <a:off x="932206" y="2288310"/>
-            <a:ext cx="7779899" cy="2081671"/>
+            <a:ext cx="7779899" cy="2438331"/>
           </a:xfrm>
           <a:prstGeom prst="rect">
             <a:avLst/>
@@ -19699,21 +19706,8 @@
                 <a:latin typeface="Arial" panose="020B0604020202020204" pitchFamily="34" charset="0"/>
                 <a:cs typeface="Arial" panose="020B0604020202020204" pitchFamily="34" charset="0"/>
               </a:rPr>
-              <a:t>Consider adding NLP/Chat data if available</a:t>
+              <a:t>Consider NLP of chats to identify bad actors before they place an order</a:t>
             </a:r>
-          </a:p>
-          <a:p>
-            <a:pPr marL="457200" lvl="0" indent="-330200" algn="l" rtl="0">
-              <a:spcBef>
-                <a:spcPts val="0"/>
-              </a:spcBef>
-              <a:spcAft>
-                <a:spcPts val="0"/>
-              </a:spcAft>
-              <a:buSzPts val="1600"/>
-              <a:buFont typeface="Courier New" panose="02070309020205020404" pitchFamily="49" charset="0"/>
-              <a:buChar char="o"/>
-            </a:pPr>
             <a:endParaRPr sz="1800" dirty="0">
               <a:latin typeface="Arial" panose="020B0604020202020204" pitchFamily="34" charset="0"/>
               <a:cs typeface="Arial" panose="020B0604020202020204" pitchFamily="34" charset="0"/>
@@ -19827,7 +19821,7 @@
         </p:nvSpPr>
         <p:spPr>
           <a:xfrm>
-            <a:off x="722374" y="435600"/>
+            <a:off x="957698" y="523006"/>
             <a:ext cx="5967538" cy="1016100"/>
           </a:xfrm>
           <a:prstGeom prst="rect">
@@ -19850,10 +19844,10 @@
               <a:buNone/>
             </a:pPr>
             <a:r>
-              <a:rPr lang="en" dirty="0"/>
-              <a:t>Thank You….</a:t>
+              <a:rPr lang="en" sz="4400" dirty="0"/>
+              <a:t>Thank You…</a:t>
             </a:r>
-            <a:endParaRPr dirty="0"/>
+            <a:endParaRPr sz="4400" dirty="0"/>
           </a:p>
         </p:txBody>
       </p:sp>
@@ -19866,7 +19860,7 @@
         <p:spPr>
           <a:xfrm>
             <a:off x="1543050" y="2464173"/>
-            <a:ext cx="6057899" cy="1846629"/>
+            <a:ext cx="6057899" cy="2123628"/>
           </a:xfrm>
           <a:prstGeom prst="rect">
             <a:avLst/>
@@ -20037,12 +20031,33 @@
               </a:rPr>
               <a:t>Github Link</a:t>
             </a:r>
-            <a:endParaRPr sz="2400" dirty="0">
+            <a:endParaRPr lang="en" dirty="0">
+              <a:solidFill>
+                <a:schemeClr val="dk2"/>
+              </a:solidFill>
               <a:latin typeface="Raleway"/>
               <a:ea typeface="Raleway"/>
               <a:cs typeface="Raleway"/>
               <a:sym typeface="Raleway"/>
             </a:endParaRPr>
+          </a:p>
+          <a:p>
+            <a:pPr algn="ctr">
+              <a:buClr>
+                <a:schemeClr val="dk2"/>
+              </a:buClr>
+              <a:buSzPts val="1100"/>
+            </a:pPr>
+            <a:r>
+              <a:rPr lang="en" dirty="0">
+                <a:solidFill>
+                  <a:schemeClr val="dk2"/>
+                </a:solidFill>
+                <a:latin typeface="Raleway"/>
+                <a:sym typeface="Raleway"/>
+              </a:rPr>
+              <a:t>LinkedIn</a:t>
+            </a:r>
           </a:p>
         </p:txBody>
       </p:sp>
@@ -20120,7 +20135,7 @@
         </p:nvSpPr>
         <p:spPr>
           <a:xfrm>
-            <a:off x="470096" y="1849696"/>
+            <a:off x="483543" y="1742120"/>
             <a:ext cx="5278522" cy="3179504"/>
           </a:xfrm>
           <a:prstGeom prst="rect">
@@ -20385,7 +20400,7 @@
                 <a:latin typeface="Arial" panose="020B0604020202020204" pitchFamily="34" charset="0"/>
                 <a:cs typeface="Arial" panose="020B0604020202020204" pitchFamily="34" charset="0"/>
               </a:rPr>
-              <a:t> LLP’s retail shopping center is losing over 10% to fraudulent payments</a:t>
+              <a:t> LLP’s (law firm) retail shopping client is losing over 10% to fraudulent payments each year</a:t>
             </a:r>
           </a:p>
           <a:p>
@@ -20420,7 +20435,7 @@
                 <a:latin typeface="Arial" panose="020B0604020202020204" pitchFamily="34" charset="0"/>
                 <a:cs typeface="Arial" panose="020B0604020202020204" pitchFamily="34" charset="0"/>
               </a:rPr>
-              <a:t>Asked me to develop a model that will identify potential fraudulent payments</a:t>
+              <a:t>Asked to develop a model that will identify potentially fraudulent payments</a:t>
             </a:r>
           </a:p>
           <a:p>
@@ -20463,7 +20478,7 @@
                 <a:latin typeface="Arial" panose="020B0604020202020204" pitchFamily="34" charset="0"/>
                 <a:cs typeface="Arial" panose="020B0604020202020204" pitchFamily="34" charset="0"/>
               </a:rPr>
-              <a:t>: Predict which customer payments are potentially fraudulent and rank these transactions</a:t>
+              <a:t>: Predict which customer payments are potentially fraudulent and rank these transactions in order</a:t>
             </a:r>
           </a:p>
         </p:txBody>
@@ -20529,7 +20544,7 @@
             </a:pPr>
             <a:r>
               <a:rPr lang="en" dirty="0"/>
-              <a:t>Data</a:t>
+              <a:t>Source Data</a:t>
             </a:r>
             <a:endParaRPr dirty="0"/>
           </a:p>
@@ -21000,7 +21015,7 @@
             </a:pPr>
             <a:r>
               <a:rPr lang="en" b="1" dirty="0"/>
-              <a:t>Avg. Fraud Transaction</a:t>
+              <a:t>Avg. Fraud Transaction ($)</a:t>
             </a:r>
             <a:endParaRPr b="1" dirty="0"/>
           </a:p>
@@ -21255,7 +21270,7 @@
                 <a:latin typeface="Arial" panose="020B0604020202020204" pitchFamily="34" charset="0"/>
                 <a:cs typeface="Arial" panose="020B0604020202020204" pitchFamily="34" charset="0"/>
               </a:rPr>
-              <a:t>Travel has highest avg. fraud</a:t>
+              <a:t>Travel has highest fraud</a:t>
             </a:r>
           </a:p>
           <a:p>
@@ -21370,7 +21385,7 @@
                 <a:latin typeface="Arial" panose="020B0604020202020204" pitchFamily="34" charset="0"/>
                 <a:cs typeface="Arial" panose="020B0604020202020204" pitchFamily="34" charset="0"/>
               </a:rPr>
-              <a:t>Highest Total Fraud</a:t>
+              <a:t>Highest Total Fraud ($)</a:t>
             </a:r>
             <a:endParaRPr sz="2800" dirty="0">
               <a:latin typeface="Arial" panose="020B0604020202020204" pitchFamily="34" charset="0"/>
@@ -22289,8 +22304,8 @@
         </p:blipFill>
         <p:spPr>
           <a:xfrm>
-            <a:off x="4572000" y="1756740"/>
-            <a:ext cx="4520241" cy="3110153"/>
+            <a:off x="4640402" y="1756736"/>
+            <a:ext cx="4451839" cy="3063089"/>
           </a:xfrm>
           <a:prstGeom prst="rect">
             <a:avLst/>
@@ -22319,7 +22334,7 @@
         </p:blipFill>
         <p:spPr>
           <a:xfrm>
-            <a:off x="41981" y="1756739"/>
+            <a:off x="145889" y="1803804"/>
             <a:ext cx="4319604" cy="2969901"/>
           </a:xfrm>
           <a:prstGeom prst="rect">
@@ -22393,7 +22408,7 @@
             </a:pPr>
             <a:r>
               <a:rPr lang="en" b="1" dirty="0"/>
-              <a:t>Final Model </a:t>
+              <a:t>Final Fraud Detection Model </a:t>
             </a:r>
             <a:endParaRPr b="1" dirty="0">
               <a:solidFill>
@@ -22419,7 +22434,7 @@
         </p:nvSpPr>
         <p:spPr>
           <a:xfrm>
-            <a:off x="893915" y="1959744"/>
+            <a:off x="834987" y="1959744"/>
             <a:ext cx="6894576" cy="1286256"/>
           </a:xfrm>
           <a:prstGeom prst="rect">
@@ -22658,21 +22673,6 @@
               </a:defRPr>
             </a:lvl9pPr>
           </a:lstStyle>
-          <a:p>
-            <a:pPr marL="133350" indent="0" algn="ctr">
-              <a:buClr>
-                <a:schemeClr val="dk2"/>
-              </a:buClr>
-            </a:pPr>
-            <a:r>
-              <a:rPr lang="en-US" sz="2000" dirty="0">
-                <a:solidFill>
-                  <a:schemeClr val="dk2"/>
-                </a:solidFill>
-              </a:rPr>
-              <a:t>After running hundreds of model iterations…</a:t>
-            </a:r>
-          </a:p>
           <a:p>
             <a:pPr marL="133350" indent="0" algn="ctr">
               <a:buClr>
@@ -23074,7 +23074,7 @@
         </p:nvSpPr>
         <p:spPr>
           <a:xfrm>
-            <a:off x="645617" y="2319618"/>
+            <a:off x="2030665" y="2487705"/>
             <a:ext cx="6515410" cy="2294449"/>
           </a:xfrm>
           <a:prstGeom prst="rect">
@@ -23746,7 +23746,7 @@
         </p:nvSpPr>
         <p:spPr>
           <a:xfrm>
-            <a:off x="1226753" y="2039427"/>
+            <a:off x="1119176" y="1875417"/>
             <a:ext cx="7235047" cy="2660320"/>
           </a:xfrm>
           <a:prstGeom prst="rect">
@@ -23774,7 +23774,7 @@
                 <a:latin typeface="Arial" panose="020B0604020202020204" pitchFamily="34" charset="0"/>
                 <a:cs typeface="Arial" panose="020B0604020202020204" pitchFamily="34" charset="0"/>
               </a:rPr>
-              <a:t>At the end of each weekly or two-week period, feed the Final Logistic Regression model with payment data</a:t>
+              <a:t>At the end of each weekly or two-week period, feed the Final Logistic Regression model with payment detail</a:t>
             </a:r>
           </a:p>
           <a:p>
@@ -23809,7 +23809,7 @@
                 <a:latin typeface="Arial" panose="020B0604020202020204" pitchFamily="34" charset="0"/>
                 <a:cs typeface="Arial" panose="020B0604020202020204" pitchFamily="34" charset="0"/>
               </a:rPr>
-              <a:t>I can update the model to include additional locations (i.e. </a:t>
+              <a:t>Continuously update the model to include additional locations (i.e. </a:t>
             </a:r>
             <a:r>
               <a:rPr lang="en-US" sz="1800" dirty="0" err="1">
@@ -23858,7 +23858,7 @@
                 <a:latin typeface="Arial" panose="020B0604020202020204" pitchFamily="34" charset="0"/>
                 <a:cs typeface="Arial" panose="020B0604020202020204" pitchFamily="34" charset="0"/>
               </a:rPr>
-              <a:t>Investigate the identified transactions and prevent delivery of any product or service unless payment has been made</a:t>
+              <a:t>Investigate the identified transactions and prevent delivery of any product or service unless payment has been verified</a:t>
             </a:r>
           </a:p>
           <a:p>

</xml_diff>